<commit_message>
runtime view in presentation
</commit_message>
<xml_diff>
--- a/DD/Slides_DD_laboratory.pptx
+++ b/DD/Slides_DD_laboratory.pptx
@@ -117,6 +117,11 @@
       </a:defRPr>
     </a:lvl9pPr>
   </p:defaultTextStyle>
+  <p:extLst>
+    <p:ext uri="{EFAFB233-063F-42B5-8137-9DF3F51BA10A}">
+      <p15:sldGuideLst xmlns:p15="http://schemas.microsoft.com/office/powerpoint/2012/main"/>
+    </p:ext>
+  </p:extLst>
 </p:presentation>
 </file>
 
@@ -263,7 +268,7 @@
           <a:p>
             <a:fld id="{A423BF71-38B7-8642-BFCE-EDAE9BD0CBAF}" type="datetimeFigureOut">
               <a:rPr lang="en-US" dirty="0"/>
-              <a:t>11/27/2017</a:t>
+              <a:t>11/29/2017</a:t>
             </a:fld>
             <a:endParaRPr lang="en-US" dirty="0"/>
           </a:p>
@@ -475,7 +480,7 @@
           <a:p>
             <a:fld id="{73B025CB-9D18-264E-A945-2D020344C9DA}" type="datetimeFigureOut">
               <a:rPr lang="en-US" dirty="0"/>
-              <a:t>11/27/2017</a:t>
+              <a:t>11/29/2017</a:t>
             </a:fld>
             <a:endParaRPr lang="en-US" dirty="0"/>
           </a:p>
@@ -691,7 +696,7 @@
           <a:p>
             <a:fld id="{507EFB6C-7E96-8F41-8872-189CA1C59F84}" type="datetimeFigureOut">
               <a:rPr lang="en-US" dirty="0"/>
-              <a:t>11/27/2017</a:t>
+              <a:t>11/29/2017</a:t>
             </a:fld>
             <a:endParaRPr lang="en-US" dirty="0"/>
           </a:p>
@@ -893,7 +898,7 @@
           <a:p>
             <a:fld id="{B6981CDE-9BE7-C544-8ACB-7077DFC4270F}" type="datetimeFigureOut">
               <a:rPr lang="en-US" dirty="0"/>
-              <a:t>11/27/2017</a:t>
+              <a:t>11/29/2017</a:t>
             </a:fld>
             <a:endParaRPr lang="en-US" dirty="0"/>
           </a:p>
@@ -1173,7 +1178,7 @@
           <a:p>
             <a:fld id="{B55BA285-9698-1B45-8319-D90A8C63F150}" type="datetimeFigureOut">
               <a:rPr lang="en-US" dirty="0"/>
-              <a:t>11/27/2017</a:t>
+              <a:t>11/29/2017</a:t>
             </a:fld>
             <a:endParaRPr lang="en-US" dirty="0"/>
           </a:p>
@@ -1442,7 +1447,7 @@
           <a:p>
             <a:fld id="{0A86CD42-43FF-B740-998F-DCC3802C4CE3}" type="datetimeFigureOut">
               <a:rPr lang="en-US" dirty="0"/>
-              <a:t>11/27/2017</a:t>
+              <a:t>11/29/2017</a:t>
             </a:fld>
             <a:endParaRPr lang="en-US" dirty="0"/>
           </a:p>
@@ -1859,7 +1864,7 @@
           <a:p>
             <a:fld id="{CEA0FFBD-2EE4-8547-BBAE-A1AC91C8D77E}" type="datetimeFigureOut">
               <a:rPr lang="en-US" dirty="0"/>
-              <a:t>11/27/2017</a:t>
+              <a:t>11/29/2017</a:t>
             </a:fld>
             <a:endParaRPr lang="en-US" dirty="0"/>
           </a:p>
@@ -2009,7 +2014,7 @@
           <a:p>
             <a:fld id="{955A2352-D7AC-F242-9256-A4477BCBF354}" type="datetimeFigureOut">
               <a:rPr lang="en-US" dirty="0"/>
-              <a:t>11/27/2017</a:t>
+              <a:t>11/29/2017</a:t>
             </a:fld>
             <a:endParaRPr lang="en-US" dirty="0"/>
           </a:p>
@@ -2136,7 +2141,7 @@
           <a:p>
             <a:fld id="{4EFCFC6A-9AE6-404D-9FDD-168B477B9C90}" type="datetimeFigureOut">
               <a:rPr lang="en-US" dirty="0"/>
-              <a:t>11/27/2017</a:t>
+              <a:t>11/29/2017</a:t>
             </a:fld>
             <a:endParaRPr lang="en-US" dirty="0"/>
           </a:p>
@@ -2382,7 +2387,7 @@
           <a:p>
             <a:fld id="{61CFCDFD-B4CF-A241-8D71-E814B10BEAF4}" type="datetimeFigureOut">
               <a:rPr lang="en-US" dirty="0"/>
-              <a:t>11/27/2017</a:t>
+              <a:t>11/29/2017</a:t>
             </a:fld>
             <a:endParaRPr lang="en-US" dirty="0"/>
           </a:p>
@@ -2832,7 +2837,7 @@
           <a:p>
             <a:fld id="{26A7B589-FD4B-7E46-869A-CBADC5FC564E}" type="datetimeFigureOut">
               <a:rPr lang="en-US" dirty="0"/>
-              <a:t>11/27/2017</a:t>
+              <a:t>11/29/2017</a:t>
             </a:fld>
             <a:endParaRPr lang="en-US" dirty="0"/>
           </a:p>
@@ -3153,7 +3158,7 @@
           <a:p>
             <a:fld id="{4CD8A92E-5FF9-8143-81B3-CCB531513398}" type="datetimeFigureOut">
               <a:rPr lang="en-US" dirty="0"/>
-              <a:t>11/27/2017</a:t>
+              <a:t>11/29/2017</a:t>
             </a:fld>
             <a:endParaRPr lang="en-US" dirty="0"/>
           </a:p>
@@ -5484,12 +5489,61 @@
           <a:chExt cx="0" cy="0"/>
         </a:xfrm>
       </p:grpSpPr>
+      <p:sp>
+        <p:nvSpPr>
+          <p:cNvPr id="2" name="Titolo 1">
+            <a:extLst>
+              <a:ext uri="{FF2B5EF4-FFF2-40B4-BE49-F238E27FC236}">
+                <a16:creationId xmlns:a16="http://schemas.microsoft.com/office/drawing/2014/main" id="{C3A6D9BF-BAAA-4169-816A-2864874506B4}"/>
+              </a:ext>
+            </a:extLst>
+          </p:cNvPr>
+          <p:cNvSpPr>
+            <a:spLocks noGrp="1"/>
+          </p:cNvSpPr>
+          <p:nvPr>
+            <p:ph type="title"/>
+          </p:nvPr>
+        </p:nvSpPr>
+        <p:spPr>
+          <a:xfrm>
+            <a:off x="9101796" y="479342"/>
+            <a:ext cx="9520158" cy="1049235"/>
+          </a:xfrm>
+        </p:spPr>
+        <p:txBody>
+          <a:bodyPr>
+            <a:normAutofit fontScale="90000"/>
+          </a:bodyPr>
+          <a:lstStyle/>
+          <a:p>
+            <a:r>
+              <a:rPr lang="en-GB" dirty="0"/>
+              <a:t>Runtime view:</a:t>
+            </a:r>
+            <a:br>
+              <a:rPr lang="en-GB" dirty="0"/>
+            </a:br>
+            <a:r>
+              <a:rPr lang="en-GB" dirty="0"/>
+              <a:t>(3) obtain </a:t>
+            </a:r>
+            <a:br>
+              <a:rPr lang="en-GB" dirty="0"/>
+            </a:br>
+            <a:r>
+              <a:rPr lang="en-GB" dirty="0"/>
+              <a:t>feasible paths</a:t>
+            </a:r>
+          </a:p>
+        </p:txBody>
+      </p:sp>
       <p:pic>
         <p:nvPicPr>
-          <p:cNvPr id="5" name="Immagine 4">
+          <p:cNvPr id="4" name="Immagine 3">
             <a:extLst>
               <a:ext uri="{FF2B5EF4-FFF2-40B4-BE49-F238E27FC236}">
-                <a16:creationId xmlns:a16="http://schemas.microsoft.com/office/drawing/2014/main" id="{5863DC94-4048-4C25-A354-FE4601C95EE6}"/>
+                <a16:creationId xmlns:a16="http://schemas.microsoft.com/office/drawing/2014/main" id="{F90DC871-66B4-4C12-AA63-290C5BFF68CF}"/>
               </a:ext>
             </a:extLst>
           </p:cNvPr>
@@ -5506,63 +5560,14 @@
         </p:blipFill>
         <p:spPr>
           <a:xfrm>
-            <a:off x="126609" y="335318"/>
-            <a:ext cx="8682219" cy="5512988"/>
+            <a:off x="292609" y="148937"/>
+            <a:ext cx="8626307" cy="6453031"/>
           </a:xfrm>
           <a:prstGeom prst="rect">
             <a:avLst/>
           </a:prstGeom>
         </p:spPr>
       </p:pic>
-      <p:sp>
-        <p:nvSpPr>
-          <p:cNvPr id="2" name="Titolo 1">
-            <a:extLst>
-              <a:ext uri="{FF2B5EF4-FFF2-40B4-BE49-F238E27FC236}">
-                <a16:creationId xmlns:a16="http://schemas.microsoft.com/office/drawing/2014/main" id="{C3A6D9BF-BAAA-4169-816A-2864874506B4}"/>
-              </a:ext>
-            </a:extLst>
-          </p:cNvPr>
-          <p:cNvSpPr>
-            <a:spLocks noGrp="1"/>
-          </p:cNvSpPr>
-          <p:nvPr>
-            <p:ph type="title"/>
-          </p:nvPr>
-        </p:nvSpPr>
-        <p:spPr>
-          <a:xfrm>
-            <a:off x="8918916" y="461054"/>
-            <a:ext cx="9520158" cy="1049235"/>
-          </a:xfrm>
-        </p:spPr>
-        <p:txBody>
-          <a:bodyPr>
-            <a:normAutofit fontScale="90000"/>
-          </a:bodyPr>
-          <a:lstStyle/>
-          <a:p>
-            <a:r>
-              <a:rPr lang="en-GB" dirty="0"/>
-              <a:t>Runtime view:</a:t>
-            </a:r>
-            <a:br>
-              <a:rPr lang="en-GB" dirty="0"/>
-            </a:br>
-            <a:r>
-              <a:rPr lang="en-GB" dirty="0"/>
-              <a:t>(3) choose between </a:t>
-            </a:r>
-            <a:br>
-              <a:rPr lang="en-GB" dirty="0"/>
-            </a:br>
-            <a:r>
-              <a:rPr lang="en-GB" dirty="0"/>
-              <a:t>overlapping events</a:t>
-            </a:r>
-          </a:p>
-        </p:txBody>
-      </p:sp>
     </p:spTree>
     <p:extLst>
       <p:ext uri="{BB962C8B-B14F-4D97-AF65-F5344CB8AC3E}">

</xml_diff>